<commit_message>
Split intro and add a presentation about setup and git
</commit_message>
<xml_diff>
--- a/Day1_AM/Workshop Overview.pptx
+++ b/Day1_AM/Workshop Overview.pptx
@@ -8,9 +8,6 @@
     <p:sldId id="256" r:id="rId2"/>
     <p:sldId id="257" r:id="rId3"/>
     <p:sldId id="261" r:id="rId4"/>
-    <p:sldId id="268" r:id="rId5"/>
-    <p:sldId id="269" r:id="rId6"/>
-    <p:sldId id="270" r:id="rId7"/>
   </p:sldIdLst>
   <p:sldSz cx="9144000" cy="6858000" type="screen4x3"/>
   <p:notesSz cx="6858000" cy="9144000"/>
@@ -306,7 +303,7 @@
           <a:p>
             <a:fld id="{6464FF7A-8C0F-48D3-B78D-C256EBC8221F}" type="datetimeFigureOut">
               <a:rPr lang="en-US" smtClean="0"/>
-              <a:t>7/6/2016</a:t>
+              <a:t>7/7/2016</a:t>
             </a:fld>
             <a:endParaRPr lang="en-US" dirty="0"/>
           </a:p>
@@ -471,7 +468,7 @@
           <a:p>
             <a:fld id="{6464FF7A-8C0F-48D3-B78D-C256EBC8221F}" type="datetimeFigureOut">
               <a:rPr lang="en-US" smtClean="0"/>
-              <a:t>7/6/2016</a:t>
+              <a:t>7/7/2016</a:t>
             </a:fld>
             <a:endParaRPr lang="en-US" dirty="0"/>
           </a:p>
@@ -646,7 +643,7 @@
           <a:p>
             <a:fld id="{6464FF7A-8C0F-48D3-B78D-C256EBC8221F}" type="datetimeFigureOut">
               <a:rPr lang="en-US" smtClean="0"/>
-              <a:t>7/6/2016</a:t>
+              <a:t>7/7/2016</a:t>
             </a:fld>
             <a:endParaRPr lang="en-US" dirty="0"/>
           </a:p>
@@ -811,7 +808,7 @@
           <a:p>
             <a:fld id="{6464FF7A-8C0F-48D3-B78D-C256EBC8221F}" type="datetimeFigureOut">
               <a:rPr lang="en-US" smtClean="0"/>
-              <a:t>7/6/2016</a:t>
+              <a:t>7/7/2016</a:t>
             </a:fld>
             <a:endParaRPr lang="en-US" dirty="0"/>
           </a:p>
@@ -1052,7 +1049,7 @@
           <a:p>
             <a:fld id="{6464FF7A-8C0F-48D3-B78D-C256EBC8221F}" type="datetimeFigureOut">
               <a:rPr lang="en-US" smtClean="0"/>
-              <a:t>7/6/2016</a:t>
+              <a:t>7/7/2016</a:t>
             </a:fld>
             <a:endParaRPr lang="en-US" dirty="0"/>
           </a:p>
@@ -1335,7 +1332,7 @@
           <a:p>
             <a:fld id="{6464FF7A-8C0F-48D3-B78D-C256EBC8221F}" type="datetimeFigureOut">
               <a:rPr lang="en-US" smtClean="0"/>
-              <a:t>7/6/2016</a:t>
+              <a:t>7/7/2016</a:t>
             </a:fld>
             <a:endParaRPr lang="en-US" dirty="0"/>
           </a:p>
@@ -1764,7 +1761,7 @@
           <a:p>
             <a:fld id="{6464FF7A-8C0F-48D3-B78D-C256EBC8221F}" type="datetimeFigureOut">
               <a:rPr lang="en-US" smtClean="0"/>
-              <a:t>7/6/2016</a:t>
+              <a:t>7/7/2016</a:t>
             </a:fld>
             <a:endParaRPr lang="en-US" dirty="0"/>
           </a:p>
@@ -1877,7 +1874,7 @@
           <a:p>
             <a:fld id="{6464FF7A-8C0F-48D3-B78D-C256EBC8221F}" type="datetimeFigureOut">
               <a:rPr lang="en-US" smtClean="0"/>
-              <a:t>7/6/2016</a:t>
+              <a:t>7/7/2016</a:t>
             </a:fld>
             <a:endParaRPr lang="en-US" dirty="0"/>
           </a:p>
@@ -1967,7 +1964,7 @@
           <a:p>
             <a:fld id="{6464FF7A-8C0F-48D3-B78D-C256EBC8221F}" type="datetimeFigureOut">
               <a:rPr lang="en-US" smtClean="0"/>
-              <a:t>7/6/2016</a:t>
+              <a:t>7/7/2016</a:t>
             </a:fld>
             <a:endParaRPr lang="en-US" dirty="0"/>
           </a:p>
@@ -2156,7 +2153,7 @@
           <a:p>
             <a:fld id="{6464FF7A-8C0F-48D3-B78D-C256EBC8221F}" type="datetimeFigureOut">
               <a:rPr lang="en-US" smtClean="0"/>
-              <a:t>7/6/2016</a:t>
+              <a:t>7/7/2016</a:t>
             </a:fld>
             <a:endParaRPr lang="en-US" dirty="0"/>
           </a:p>
@@ -2474,7 +2471,7 @@
           <a:p>
             <a:fld id="{6464FF7A-8C0F-48D3-B78D-C256EBC8221F}" type="datetimeFigureOut">
               <a:rPr lang="en-US" smtClean="0"/>
-              <a:t>7/6/2016</a:t>
+              <a:t>7/7/2016</a:t>
             </a:fld>
             <a:endParaRPr lang="en-US" dirty="0"/>
           </a:p>
@@ -2853,7 +2850,7 @@
           <a:p>
             <a:fld id="{6464FF7A-8C0F-48D3-B78D-C256EBC8221F}" type="datetimeFigureOut">
               <a:rPr lang="en-US" smtClean="0"/>
-              <a:t>7/6/2016</a:t>
+              <a:t>7/7/2016</a:t>
             </a:fld>
             <a:endParaRPr lang="en-US" dirty="0"/>
           </a:p>
@@ -3228,7 +3225,6 @@
               <a:rPr lang="en-US" dirty="0" smtClean="0"/>
               <a:t>QCPT Group</a:t>
             </a:r>
-            <a:endParaRPr lang="en-US" dirty="0" smtClean="0"/>
           </a:p>
           <a:p>
             <a:r>
@@ -3311,7 +3307,9 @@
         </p:nvSpPr>
         <p:spPr/>
         <p:txBody>
-          <a:bodyPr/>
+          <a:bodyPr>
+            <a:normAutofit/>
+          </a:bodyPr>
           <a:lstStyle/>
           <a:p>
             <a:pPr marL="114300" indent="0">
@@ -3319,7 +3317,19 @@
             </a:pPr>
             <a:r>
               <a:rPr lang="en-US" dirty="0" smtClean="0"/>
-              <a:t>The goal of this workshop is to become familiar with PBPK model development within the </a:t>
+              <a:t>The goal of this workshop is to help you become familiar with PBPK modeling and the implementation of such models within the MCSim platform. Through this workshop, you will become familiar with…</a:t>
+            </a:r>
+          </a:p>
+          <a:p>
+            <a:r>
+              <a:rPr lang="en-US" dirty="0" smtClean="0"/>
+              <a:t>The development of PBPK model equations based on physiological and drug-specific properties</a:t>
+            </a:r>
+          </a:p>
+          <a:p>
+            <a:r>
+              <a:rPr lang="en-US" dirty="0" smtClean="0"/>
+              <a:t>Writing coupled systems of ordinary differential equations in </a:t>
             </a:r>
             <a:r>
               <a:rPr lang="en-US" dirty="0" err="1" smtClean="0"/>
@@ -3327,32 +3337,6 @@
             </a:r>
             <a:r>
               <a:rPr lang="en-US" dirty="0" smtClean="0"/>
-              <a:t> platform. Throughout this workshop, you will become familiar with…</a:t>
-            </a:r>
-          </a:p>
-          <a:p>
-            <a:pPr marL="114300" indent="0">
-              <a:buNone/>
-            </a:pPr>
-            <a:endParaRPr lang="en-US" dirty="0"/>
-          </a:p>
-          <a:p>
-            <a:r>
-              <a:rPr lang="en-US" dirty="0" smtClean="0"/>
-              <a:t>The development of PBPK model equations based on physiological and drug-specific properties</a:t>
-            </a:r>
-          </a:p>
-          <a:p>
-            <a:r>
-              <a:rPr lang="en-US" dirty="0" smtClean="0"/>
-              <a:t>Writing coupled systems of ordinary differential equations in </a:t>
-            </a:r>
-            <a:r>
-              <a:rPr lang="en-US" dirty="0" err="1" smtClean="0"/>
-              <a:t>MCSim</a:t>
-            </a:r>
-            <a:r>
-              <a:rPr lang="en-US" dirty="0" smtClean="0"/>
               <a:t> to describe the absorption, distribution, metabolism, and elimination of a drug</a:t>
             </a:r>
           </a:p>
@@ -3361,7 +3345,6 @@
               <a:rPr lang="en-US" dirty="0" smtClean="0"/>
               <a:t>The implementation of parameter estimation techniques to fit model parameters to measured pharmacokinetic data </a:t>
             </a:r>
-            <a:endParaRPr lang="en-US" dirty="0" smtClean="0"/>
           </a:p>
           <a:p>
             <a:r>
@@ -3464,13 +3447,16 @@
             <a:pPr lvl="1"/>
             <a:r>
               <a:rPr lang="en-US" dirty="0" smtClean="0"/>
-              <a:t>AM: Introduction to PBPK modeling and </a:t>
-            </a:r>
-            <a:r>
-              <a:rPr lang="en-US" dirty="0" err="1" smtClean="0"/>
-              <a:t>MCSim</a:t>
-            </a:r>
-            <a:endParaRPr lang="en-US" dirty="0" smtClean="0"/>
+              <a:t>AM: </a:t>
+            </a:r>
+            <a:r>
+              <a:rPr lang="en-US" dirty="0" smtClean="0"/>
+              <a:t>Computer setup </a:t>
+            </a:r>
+            <a:r>
+              <a:rPr lang="en-US" dirty="0" smtClean="0"/>
+              <a:t>and revision control, PBPK modeling, and MCSim</a:t>
+            </a:r>
           </a:p>
           <a:p>
             <a:pPr lvl="1"/>
@@ -3551,530 +3537,6 @@
       </p:par>
     </p:tnLst>
   </p:timing>
-</p:sld>
-</file>
-
-<file path=ppt/slides/slide4.xml><?xml version="1.0" encoding="utf-8"?>
-<p:sld xmlns:a="http://schemas.openxmlformats.org/drawingml/2006/main" xmlns:r="http://schemas.openxmlformats.org/officeDocument/2006/relationships" xmlns:p="http://schemas.openxmlformats.org/presentationml/2006/main">
-  <p:cSld>
-    <p:spTree>
-      <p:nvGrpSpPr>
-        <p:cNvPr id="1" name=""/>
-        <p:cNvGrpSpPr/>
-        <p:nvPr/>
-      </p:nvGrpSpPr>
-      <p:grpSpPr>
-        <a:xfrm>
-          <a:off x="0" y="0"/>
-          <a:ext cx="0" cy="0"/>
-          <a:chOff x="0" y="0"/>
-          <a:chExt cx="0" cy="0"/>
-        </a:xfrm>
-      </p:grpSpPr>
-      <p:sp>
-        <p:nvSpPr>
-          <p:cNvPr id="2" name="Title 1"/>
-          <p:cNvSpPr>
-            <a:spLocks noGrp="1"/>
-          </p:cNvSpPr>
-          <p:nvPr>
-            <p:ph type="title"/>
-          </p:nvPr>
-        </p:nvSpPr>
-        <p:spPr/>
-        <p:txBody>
-          <a:bodyPr/>
-          <a:lstStyle/>
-          <a:p>
-            <a:r>
-              <a:rPr lang="en-US" dirty="0" smtClean="0"/>
-              <a:t>General housekeeping</a:t>
-            </a:r>
-            <a:endParaRPr lang="en-US" dirty="0"/>
-          </a:p>
-        </p:txBody>
-      </p:sp>
-      <p:sp>
-        <p:nvSpPr>
-          <p:cNvPr id="3" name="Content Placeholder 2"/>
-          <p:cNvSpPr>
-            <a:spLocks noGrp="1"/>
-          </p:cNvSpPr>
-          <p:nvPr>
-            <p:ph idx="1"/>
-          </p:nvPr>
-        </p:nvSpPr>
-        <p:spPr/>
-        <p:txBody>
-          <a:bodyPr>
-            <a:normAutofit fontScale="92500" lnSpcReduction="20000"/>
-          </a:bodyPr>
-          <a:lstStyle/>
-          <a:p>
-            <a:r>
-              <a:rPr lang="en-US" dirty="0" smtClean="0"/>
-              <a:t>Before </a:t>
-            </a:r>
-            <a:r>
-              <a:rPr lang="en-US" dirty="0" smtClean="0"/>
-              <a:t>getting into the modeling, we need to set up the directory structure and paths.</a:t>
-            </a:r>
-          </a:p>
-          <a:p>
-            <a:endParaRPr lang="en-US" dirty="0"/>
-          </a:p>
-          <a:p>
-            <a:r>
-              <a:rPr lang="en-US" dirty="0" smtClean="0"/>
-              <a:t>Start with </a:t>
-            </a:r>
-            <a:r>
-              <a:rPr lang="en-US" dirty="0" err="1" smtClean="0"/>
-              <a:t>git</a:t>
-            </a:r>
-            <a:r>
-              <a:rPr lang="en-US" dirty="0" smtClean="0"/>
-              <a:t> and version control</a:t>
-            </a:r>
-          </a:p>
-          <a:p>
-            <a:pPr lvl="1"/>
-            <a:r>
-              <a:rPr lang="en-US" dirty="0" smtClean="0"/>
-              <a:t>‘Pull’ our material from a </a:t>
-            </a:r>
-            <a:r>
-              <a:rPr lang="en-US" dirty="0" err="1" smtClean="0"/>
-              <a:t>git</a:t>
-            </a:r>
-            <a:r>
-              <a:rPr lang="en-US" dirty="0" smtClean="0"/>
-              <a:t> repo</a:t>
-            </a:r>
-          </a:p>
-          <a:p>
-            <a:endParaRPr lang="en-US" dirty="0"/>
-          </a:p>
-          <a:p>
-            <a:r>
-              <a:rPr lang="en-US" dirty="0" smtClean="0"/>
-              <a:t>Update machine and install </a:t>
-            </a:r>
-            <a:r>
-              <a:rPr lang="en-US" dirty="0" err="1" smtClean="0"/>
-              <a:t>git</a:t>
-            </a:r>
-            <a:endParaRPr lang="en-US" dirty="0" smtClean="0"/>
-          </a:p>
-          <a:p>
-            <a:pPr lvl="1"/>
-            <a:r>
-              <a:rPr lang="en-US" dirty="0" err="1" smtClean="0">
-                <a:latin typeface="Courier New" panose="02070309020205020404" pitchFamily="49" charset="0"/>
-                <a:cs typeface="Courier New" panose="02070309020205020404" pitchFamily="49" charset="0"/>
-              </a:rPr>
-              <a:t>su</a:t>
-            </a:r>
-            <a:endParaRPr lang="en-US" dirty="0" smtClean="0">
-              <a:latin typeface="Courier New" panose="02070309020205020404" pitchFamily="49" charset="0"/>
-              <a:cs typeface="Courier New" panose="02070309020205020404" pitchFamily="49" charset="0"/>
-            </a:endParaRPr>
-          </a:p>
-          <a:p>
-            <a:pPr lvl="1"/>
-            <a:r>
-              <a:rPr lang="en-US" dirty="0" smtClean="0">
-                <a:latin typeface="Courier New" panose="02070309020205020404" pitchFamily="49" charset="0"/>
-                <a:cs typeface="Courier New" panose="02070309020205020404" pitchFamily="49" charset="0"/>
-              </a:rPr>
-              <a:t>&lt;password&gt;</a:t>
-            </a:r>
-          </a:p>
-          <a:p>
-            <a:pPr lvl="1"/>
-            <a:r>
-              <a:rPr lang="en-US" dirty="0" smtClean="0">
-                <a:latin typeface="Courier New" panose="02070309020205020404" pitchFamily="49" charset="0"/>
-                <a:cs typeface="Courier New" panose="02070309020205020404" pitchFamily="49" charset="0"/>
-              </a:rPr>
-              <a:t>aptitude update</a:t>
-            </a:r>
-          </a:p>
-          <a:p>
-            <a:pPr lvl="1"/>
-            <a:r>
-              <a:rPr lang="en-US" dirty="0">
-                <a:latin typeface="Courier New" panose="02070309020205020404" pitchFamily="49" charset="0"/>
-                <a:cs typeface="Courier New" panose="02070309020205020404" pitchFamily="49" charset="0"/>
-              </a:rPr>
-              <a:t>a</a:t>
-            </a:r>
-            <a:r>
-              <a:rPr lang="en-US" dirty="0" smtClean="0">
-                <a:latin typeface="Courier New" panose="02070309020205020404" pitchFamily="49" charset="0"/>
-                <a:cs typeface="Courier New" panose="02070309020205020404" pitchFamily="49" charset="0"/>
-              </a:rPr>
-              <a:t>ptitude upgrade</a:t>
-            </a:r>
-          </a:p>
-          <a:p>
-            <a:pPr lvl="1"/>
-            <a:r>
-              <a:rPr lang="en-US" dirty="0" smtClean="0">
-                <a:latin typeface="Courier New" panose="02070309020205020404" pitchFamily="49" charset="0"/>
-                <a:cs typeface="Courier New" panose="02070309020205020404" pitchFamily="49" charset="0"/>
-              </a:rPr>
-              <a:t>aptitude install </a:t>
-            </a:r>
-            <a:r>
-              <a:rPr lang="en-US" dirty="0" err="1" smtClean="0">
-                <a:latin typeface="Courier New" panose="02070309020205020404" pitchFamily="49" charset="0"/>
-                <a:cs typeface="Courier New" panose="02070309020205020404" pitchFamily="49" charset="0"/>
-              </a:rPr>
-              <a:t>git</a:t>
-            </a:r>
-            <a:r>
-              <a:rPr lang="en-US" dirty="0" smtClean="0">
-                <a:latin typeface="Courier New" panose="02070309020205020404" pitchFamily="49" charset="0"/>
-                <a:cs typeface="Courier New" panose="02070309020205020404" pitchFamily="49" charset="0"/>
-              </a:rPr>
-              <a:t>-all</a:t>
-            </a:r>
-          </a:p>
-          <a:p>
-            <a:endParaRPr lang="en-US" dirty="0" smtClean="0"/>
-          </a:p>
-          <a:p>
-            <a:r>
-              <a:rPr lang="en-US" dirty="0" smtClean="0"/>
-              <a:t>Make sure you are on your home directory:</a:t>
-            </a:r>
-          </a:p>
-          <a:p>
-            <a:pPr lvl="1"/>
-            <a:r>
-              <a:rPr lang="en-US" sz="1700" dirty="0" err="1" smtClean="0">
-                <a:latin typeface="Courier New" panose="02070309020205020404" pitchFamily="49" charset="0"/>
-                <a:cs typeface="Courier New" panose="02070309020205020404" pitchFamily="49" charset="0"/>
-              </a:rPr>
-              <a:t>git</a:t>
-            </a:r>
-            <a:r>
-              <a:rPr lang="en-US" sz="1700" dirty="0" smtClean="0">
-                <a:latin typeface="Courier New" panose="02070309020205020404" pitchFamily="49" charset="0"/>
-                <a:cs typeface="Courier New" panose="02070309020205020404" pitchFamily="49" charset="0"/>
-              </a:rPr>
-              <a:t> clone </a:t>
-            </a:r>
-            <a:r>
-              <a:rPr lang="en-US" sz="1700" dirty="0" smtClean="0">
-                <a:latin typeface="Courier New" panose="02070309020205020404" pitchFamily="49" charset="0"/>
-                <a:cs typeface="Courier New" panose="02070309020205020404" pitchFamily="49" charset="0"/>
-                <a:hlinkClick r:id="rId2"/>
-              </a:rPr>
-              <a:t>https://github.com/CSU-QCPT/PBPK-workshop.git</a:t>
-            </a:r>
-            <a:endParaRPr lang="en-US" sz="1700" dirty="0" smtClean="0">
-              <a:latin typeface="Courier New" panose="02070309020205020404" pitchFamily="49" charset="0"/>
-              <a:cs typeface="Courier New" panose="02070309020205020404" pitchFamily="49" charset="0"/>
-            </a:endParaRPr>
-          </a:p>
-          <a:p>
-            <a:pPr lvl="1"/>
-            <a:r>
-              <a:rPr lang="en-US" sz="1700" dirty="0" smtClean="0">
-                <a:latin typeface="Courier New" panose="02070309020205020404" pitchFamily="49" charset="0"/>
-                <a:cs typeface="Courier New" panose="02070309020205020404" pitchFamily="49" charset="0"/>
-              </a:rPr>
-              <a:t>cd PBPK-workshop</a:t>
-            </a:r>
-          </a:p>
-        </p:txBody>
-      </p:sp>
-    </p:spTree>
-    <p:extLst>
-      <p:ext uri="{BB962C8B-B14F-4D97-AF65-F5344CB8AC3E}">
-        <p14:creationId xmlns:p14="http://schemas.microsoft.com/office/powerpoint/2010/main" val="701453360"/>
-      </p:ext>
-    </p:extLst>
-  </p:cSld>
-  <p:clrMapOvr>
-    <a:masterClrMapping/>
-  </p:clrMapOvr>
-  <p:timing>
-    <p:tnLst>
-      <p:par>
-        <p:cTn id="1" dur="indefinite" restart="never" nodeType="tmRoot"/>
-      </p:par>
-    </p:tnLst>
-  </p:timing>
-</p:sld>
-</file>
-
-<file path=ppt/slides/slide5.xml><?xml version="1.0" encoding="utf-8"?>
-<p:sld xmlns:a="http://schemas.openxmlformats.org/drawingml/2006/main" xmlns:r="http://schemas.openxmlformats.org/officeDocument/2006/relationships" xmlns:p="http://schemas.openxmlformats.org/presentationml/2006/main">
-  <p:cSld>
-    <p:spTree>
-      <p:nvGrpSpPr>
-        <p:cNvPr id="1" name=""/>
-        <p:cNvGrpSpPr/>
-        <p:nvPr/>
-      </p:nvGrpSpPr>
-      <p:grpSpPr>
-        <a:xfrm>
-          <a:off x="0" y="0"/>
-          <a:ext cx="0" cy="0"/>
-          <a:chOff x="0" y="0"/>
-          <a:chExt cx="0" cy="0"/>
-        </a:xfrm>
-      </p:grpSpPr>
-      <p:sp>
-        <p:nvSpPr>
-          <p:cNvPr id="2" name="Title 1"/>
-          <p:cNvSpPr>
-            <a:spLocks noGrp="1"/>
-          </p:cNvSpPr>
-          <p:nvPr>
-            <p:ph type="title"/>
-          </p:nvPr>
-        </p:nvSpPr>
-        <p:spPr/>
-        <p:txBody>
-          <a:bodyPr/>
-          <a:lstStyle/>
-          <a:p>
-            <a:r>
-              <a:rPr lang="en-US" dirty="0" err="1" smtClean="0"/>
-              <a:t>git</a:t>
-            </a:r>
-            <a:r>
-              <a:rPr lang="en-US" dirty="0" smtClean="0"/>
-              <a:t> for version control</a:t>
-            </a:r>
-            <a:endParaRPr lang="en-US" dirty="0"/>
-          </a:p>
-        </p:txBody>
-      </p:sp>
-      <p:sp>
-        <p:nvSpPr>
-          <p:cNvPr id="3" name="Content Placeholder 2"/>
-          <p:cNvSpPr>
-            <a:spLocks noGrp="1"/>
-          </p:cNvSpPr>
-          <p:nvPr>
-            <p:ph idx="1"/>
-          </p:nvPr>
-        </p:nvSpPr>
-        <p:spPr/>
-        <p:txBody>
-          <a:bodyPr/>
-          <a:lstStyle/>
-          <a:p>
-            <a:r>
-              <a:rPr lang="en-US" dirty="0" smtClean="0"/>
-              <a:t>&lt;Fill in highlights of </a:t>
-            </a:r>
-            <a:r>
-              <a:rPr lang="en-US" dirty="0" err="1" smtClean="0"/>
-              <a:t>git</a:t>
-            </a:r>
-            <a:r>
-              <a:rPr lang="en-US" dirty="0" smtClean="0"/>
-              <a:t>&gt;</a:t>
-            </a:r>
-          </a:p>
-          <a:p>
-            <a:pPr lvl="1"/>
-            <a:r>
-              <a:rPr lang="en-US" dirty="0" err="1">
-                <a:latin typeface="Courier New" panose="02070309020205020404" pitchFamily="49" charset="0"/>
-                <a:cs typeface="Courier New" panose="02070309020205020404" pitchFamily="49" charset="0"/>
-              </a:rPr>
-              <a:t>git</a:t>
-            </a:r>
-            <a:r>
-              <a:rPr lang="en-US" dirty="0">
-                <a:latin typeface="Courier New" panose="02070309020205020404" pitchFamily="49" charset="0"/>
-                <a:cs typeface="Courier New" panose="02070309020205020404" pitchFamily="49" charset="0"/>
-              </a:rPr>
-              <a:t> </a:t>
-            </a:r>
-            <a:r>
-              <a:rPr lang="en-US" dirty="0" smtClean="0">
-                <a:latin typeface="Courier New" panose="02070309020205020404" pitchFamily="49" charset="0"/>
-                <a:cs typeface="Courier New" panose="02070309020205020404" pitchFamily="49" charset="0"/>
-              </a:rPr>
-              <a:t>add .</a:t>
-            </a:r>
-            <a:endParaRPr lang="en-US" dirty="0" smtClean="0"/>
-          </a:p>
-          <a:p>
-            <a:pPr lvl="1"/>
-            <a:r>
-              <a:rPr lang="en-US" dirty="0" err="1" smtClean="0">
-                <a:latin typeface="Courier New" panose="02070309020205020404" pitchFamily="49" charset="0"/>
-                <a:cs typeface="Courier New" panose="02070309020205020404" pitchFamily="49" charset="0"/>
-              </a:rPr>
-              <a:t>git</a:t>
-            </a:r>
-            <a:r>
-              <a:rPr lang="en-US" dirty="0" smtClean="0">
-                <a:latin typeface="Courier New" panose="02070309020205020404" pitchFamily="49" charset="0"/>
-                <a:cs typeface="Courier New" panose="02070309020205020404" pitchFamily="49" charset="0"/>
-              </a:rPr>
-              <a:t> commit -m “&lt;message&gt;”</a:t>
-            </a:r>
-          </a:p>
-          <a:p>
-            <a:endParaRPr lang="en-US" dirty="0">
-              <a:latin typeface="Courier New" panose="02070309020205020404" pitchFamily="49" charset="0"/>
-              <a:cs typeface="Courier New" panose="02070309020205020404" pitchFamily="49" charset="0"/>
-            </a:endParaRPr>
-          </a:p>
-          <a:p>
-            <a:r>
-              <a:rPr lang="en-US" dirty="0" smtClean="0">
-                <a:cs typeface="Courier New" panose="02070309020205020404" pitchFamily="49" charset="0"/>
-              </a:rPr>
-              <a:t>Allows us to “save” our work and go back if we mess up</a:t>
-            </a:r>
-          </a:p>
-          <a:p>
-            <a:pPr lvl="1"/>
-            <a:r>
-              <a:rPr lang="en-US" dirty="0" smtClean="0">
-                <a:cs typeface="Courier New" panose="02070309020205020404" pitchFamily="49" charset="0"/>
-              </a:rPr>
-              <a:t>Every time you get the model to work, commit the changes</a:t>
-            </a:r>
-          </a:p>
-          <a:p>
-            <a:pPr lvl="1"/>
-            <a:r>
-              <a:rPr lang="en-US" dirty="0" smtClean="0">
-                <a:cs typeface="Courier New" panose="02070309020205020404" pitchFamily="49" charset="0"/>
-              </a:rPr>
-              <a:t>If you ‘break’ the model or make a change you can’t recall, go back to last commit:</a:t>
-            </a:r>
-          </a:p>
-          <a:p>
-            <a:pPr lvl="2"/>
-            <a:r>
-              <a:rPr lang="en-US" dirty="0" err="1" smtClean="0">
-                <a:latin typeface="Courier New" panose="02070309020205020404" pitchFamily="49" charset="0"/>
-                <a:cs typeface="Courier New" panose="02070309020205020404" pitchFamily="49" charset="0"/>
-              </a:rPr>
-              <a:t>git</a:t>
-            </a:r>
-            <a:r>
-              <a:rPr lang="en-US" dirty="0" smtClean="0">
-                <a:latin typeface="Courier New" panose="02070309020205020404" pitchFamily="49" charset="0"/>
-                <a:cs typeface="Courier New" panose="02070309020205020404" pitchFamily="49" charset="0"/>
-              </a:rPr>
-              <a:t> reset --hard HEAD^</a:t>
-            </a:r>
-            <a:endParaRPr lang="en-US" dirty="0">
-              <a:latin typeface="Courier New" panose="02070309020205020404" pitchFamily="49" charset="0"/>
-              <a:cs typeface="Courier New" panose="02070309020205020404" pitchFamily="49" charset="0"/>
-            </a:endParaRPr>
-          </a:p>
-        </p:txBody>
-      </p:sp>
-    </p:spTree>
-    <p:extLst>
-      <p:ext uri="{BB962C8B-B14F-4D97-AF65-F5344CB8AC3E}">
-        <p14:creationId xmlns:p14="http://schemas.microsoft.com/office/powerpoint/2010/main" val="3490705773"/>
-      </p:ext>
-    </p:extLst>
-  </p:cSld>
-  <p:clrMapOvr>
-    <a:masterClrMapping/>
-  </p:clrMapOvr>
-</p:sld>
-</file>
-
-<file path=ppt/slides/slide6.xml><?xml version="1.0" encoding="utf-8"?>
-<p:sld xmlns:a="http://schemas.openxmlformats.org/drawingml/2006/main" xmlns:r="http://schemas.openxmlformats.org/officeDocument/2006/relationships" xmlns:p="http://schemas.openxmlformats.org/presentationml/2006/main">
-  <p:cSld>
-    <p:spTree>
-      <p:nvGrpSpPr>
-        <p:cNvPr id="1" name=""/>
-        <p:cNvGrpSpPr/>
-        <p:nvPr/>
-      </p:nvGrpSpPr>
-      <p:grpSpPr>
-        <a:xfrm>
-          <a:off x="0" y="0"/>
-          <a:ext cx="0" cy="0"/>
-          <a:chOff x="0" y="0"/>
-          <a:chExt cx="0" cy="0"/>
-        </a:xfrm>
-      </p:grpSpPr>
-      <p:sp>
-        <p:nvSpPr>
-          <p:cNvPr id="2" name="Title 1"/>
-          <p:cNvSpPr>
-            <a:spLocks noGrp="1"/>
-          </p:cNvSpPr>
-          <p:nvPr>
-            <p:ph type="title"/>
-          </p:nvPr>
-        </p:nvSpPr>
-        <p:spPr/>
-        <p:txBody>
-          <a:bodyPr/>
-          <a:lstStyle/>
-          <a:p>
-            <a:pPr>
-              <a:tabLst>
-                <a:tab pos="2341563" algn="l"/>
-              </a:tabLst>
-            </a:pPr>
-            <a:r>
-              <a:rPr lang="en-US" dirty="0" smtClean="0"/>
-              <a:t>Set up Linux </a:t>
-            </a:r>
-            <a:r>
-              <a:rPr lang="en-US" dirty="0" err="1" smtClean="0"/>
-              <a:t>environement</a:t>
-            </a:r>
-            <a:endParaRPr lang="en-US" dirty="0"/>
-          </a:p>
-        </p:txBody>
-      </p:sp>
-      <p:sp>
-        <p:nvSpPr>
-          <p:cNvPr id="3" name="Content Placeholder 2"/>
-          <p:cNvSpPr>
-            <a:spLocks noGrp="1"/>
-          </p:cNvSpPr>
-          <p:nvPr>
-            <p:ph idx="1"/>
-          </p:nvPr>
-        </p:nvSpPr>
-        <p:spPr/>
-        <p:txBody>
-          <a:bodyPr/>
-          <a:lstStyle/>
-          <a:p>
-            <a:r>
-              <a:rPr lang="en-US" dirty="0" smtClean="0"/>
-              <a:t>Before going too much further, let’s make sure everyone is on the same page.</a:t>
-            </a:r>
-            <a:endParaRPr lang="en-US" dirty="0"/>
-          </a:p>
-        </p:txBody>
-      </p:sp>
-    </p:spTree>
-    <p:extLst>
-      <p:ext uri="{BB962C8B-B14F-4D97-AF65-F5344CB8AC3E}">
-        <p14:creationId xmlns:p14="http://schemas.microsoft.com/office/powerpoint/2010/main" val="3370975834"/>
-      </p:ext>
-    </p:extLst>
-  </p:cSld>
-  <p:clrMapOvr>
-    <a:masterClrMapping/>
-  </p:clrMapOvr>
 </p:sld>
 </file>
 

</xml_diff>